<commit_message>
Update GPIO driver validation (DV_GPIO.MC.c) in sync with other driver validations (+ some other minor updates and cleanup)
</commit_message>
<xml_diff>
--- a/DoxyGen/src/images/src/GPIO_pin_connection.pptx
+++ b/DoxyGen/src/images/src/GPIO_pin_connection.pptx
@@ -255,7 +255,7 @@
             <a:fld id="{E72D30EF-8F20-0B47-8B5D-39A8BC29E860}" type="datetimeFigureOut">
               <a:rPr lang="en-US" smtClean="0"/>
               <a:pPr/>
-              <a:t>7/19/2023</a:t>
+              <a:t>07-Sep-23</a:t>
             </a:fld>
             <a:endParaRPr lang="en-US"/>
           </a:p>
@@ -423,7 +423,7 @@
             <a:fld id="{77EDD36E-1E02-F241-9611-1F1D9EAAD326}" type="datetimeFigureOut">
               <a:rPr lang="en-US" smtClean="0"/>
               <a:pPr/>
-              <a:t>7/19/2023</a:t>
+              <a:t>07-Sep-23</a:t>
             </a:fld>
             <a:endParaRPr lang="en-US"/>
           </a:p>
@@ -3922,58 +3922,6 @@
       </p:sp>
       <p:sp>
         <p:nvSpPr>
-          <p:cNvPr id="46" name="TextBox 45">
-            <a:extLst>
-              <a:ext uri="{FF2B5EF4-FFF2-40B4-BE49-F238E27FC236}">
-                <a16:creationId xmlns:a16="http://schemas.microsoft.com/office/drawing/2014/main" id="{82752C36-772A-45CA-AE69-E0D97793F4C7}"/>
-              </a:ext>
-            </a:extLst>
-          </p:cNvPr>
-          <p:cNvSpPr txBox="1"/>
-          <p:nvPr/>
-        </p:nvSpPr>
-        <p:spPr bwMode="auto">
-          <a:xfrm>
-            <a:off x="2981367" y="3753674"/>
-            <a:ext cx="1484464" cy="288000"/>
-          </a:xfrm>
-          <a:prstGeom prst="rect">
-            <a:avLst/>
-          </a:prstGeom>
-          <a:solidFill>
-            <a:schemeClr val="bg1">
-              <a:lumMod val="85000"/>
-            </a:schemeClr>
-          </a:solidFill>
-          <a:ln w="19050">
-            <a:solidFill>
-              <a:schemeClr val="accent1"/>
-            </a:solidFill>
-          </a:ln>
-        </p:spPr>
-        <p:txBody>
-          <a:bodyPr wrap="square" rIns="144000">
-            <a:spAutoFit/>
-          </a:bodyPr>
-          <a:lstStyle/>
-          <a:p>
-            <a:pPr algn="ctr">
-              <a:defRPr/>
-            </a:pPr>
-            <a:r>
-              <a:rPr lang="en-US" sz="1200" b="1" dirty="0">
-                <a:latin typeface="+mn-lt"/>
-              </a:rPr>
-              <a:t>Ground (GND)</a:t>
-            </a:r>
-            <a:endParaRPr lang="en-GB" sz="1200" b="1" dirty="0">
-              <a:latin typeface="+mn-lt"/>
-            </a:endParaRPr>
-          </a:p>
-        </p:txBody>
-      </p:sp>
-      <p:sp>
-        <p:nvSpPr>
           <p:cNvPr id="47" name="Rounded Rectangle 70">
             <a:extLst>
               <a:ext uri="{FF2B5EF4-FFF2-40B4-BE49-F238E27FC236}">
@@ -4296,7 +4244,7 @@
             <a:avLst/>
           </a:prstGeom>
           <a:noFill/>
-          <a:ln>
+          <a:ln w="38100">
             <a:solidFill>
               <a:schemeClr val="accent1"/>
             </a:solidFill>
@@ -5354,61 +5302,24 @@
 </file>
 
 <file path=customXml/item1.xml><?xml version="1.0" encoding="utf-8"?>
-<?mso-contentType ?>
-<spe:Receivers xmlns:spe="http://schemas.microsoft.com/sharepoint/events">
-  <Receiver>
-    <Name>Document ID Generator</Name>
-    <Synchronization>Synchronous</Synchronization>
-    <Type>10001</Type>
-    <SequenceNumber>1000</SequenceNumber>
-    <Assembly>Microsoft.Office.DocumentManagement, Version=14.0.0.0, Culture=neutral, PublicKeyToken=71e9bce111e9429c</Assembly>
-    <Class>Microsoft.Office.DocumentManagement.Internal.DocIdHandler</Class>
-    <Data/>
-    <Filter/>
-  </Receiver>
-  <Receiver>
-    <Name>Document ID Generator</Name>
-    <Synchronization>Synchronous</Synchronization>
-    <Type>10002</Type>
-    <SequenceNumber>1001</SequenceNumber>
-    <Assembly>Microsoft.Office.DocumentManagement, Version=14.0.0.0, Culture=neutral, PublicKeyToken=71e9bce111e9429c</Assembly>
-    <Class>Microsoft.Office.DocumentManagement.Internal.DocIdHandler</Class>
-    <Data/>
-    <Filter/>
-  </Receiver>
-  <Receiver>
-    <Name>Document ID Generator</Name>
-    <Synchronization>Synchronous</Synchronization>
-    <Type>10004</Type>
-    <SequenceNumber>1002</SequenceNumber>
-    <Assembly>Microsoft.Office.DocumentManagement, Version=14.0.0.0, Culture=neutral, PublicKeyToken=71e9bce111e9429c</Assembly>
-    <Class>Microsoft.Office.DocumentManagement.Internal.DocIdHandler</Class>
-    <Data/>
-    <Filter/>
-  </Receiver>
-  <Receiver>
-    <Name>Document ID Generator</Name>
-    <Synchronization>Synchronous</Synchronization>
-    <Type>10006</Type>
-    <SequenceNumber>1003</SequenceNumber>
-    <Assembly>Microsoft.Office.DocumentManagement, Version=14.0.0.0, Culture=neutral, PublicKeyToken=71e9bce111e9429c</Assembly>
-    <Class>Microsoft.Office.DocumentManagement.Internal.DocIdHandler</Class>
-    <Data/>
-    <Filter/>
-  </Receiver>
-</spe:Receivers>
+<p:properties xmlns:p="http://schemas.microsoft.com/office/2006/metadata/properties" xmlns:xsi="http://www.w3.org/2001/XMLSchema-instance">
+  <documentManagement>
+    <AlternateThumbnailUrl xmlns="http://schemas.microsoft.com/sharepoint/v3">
+      <Url xsi:nil="true"/>
+      <Description xsi:nil="true"/>
+    </AlternateThumbnailUrl>
+    <ImageCreateDate xmlns="http://schemas.microsoft.com/sharepoint/v3" xsi:nil="true"/>
+    <Description xmlns="http://schemas.microsoft.com/sharepoint/v3" xsi:nil="true"/>
+    <_dlc_DocId xmlns="f2ad5090-61a8-4b8c-ab70-68f4ff4d1933">ARM-ECM-0151353</_dlc_DocId>
+    <_dlc_DocIdUrl xmlns="f2ad5090-61a8-4b8c-ab70-68f4ff4d1933">
+      <Url>http://teamsites.arm.com/sites/marketing/branding/_layouts/DocIdRedir.aspx?ID=ARM-ECM-0151353</Url>
+      <Description>ARM-ECM-0151353</Description>
+    </_dlc_DocIdUrl>
+  </documentManagement>
+</p:properties>
 </file>
 
 <file path=customXml/item2.xml><?xml version="1.0" encoding="utf-8"?>
-<?mso-contentType ?>
-<FormTemplates xmlns="http://schemas.microsoft.com/sharepoint/v3/contenttype/forms">
-  <Display>DocumentLibraryForm</Display>
-  <Edit>DocumentLibraryForm</Edit>
-  <New>DocumentLibraryForm</New>
-</FormTemplates>
-</file>
-
-<file path=customXml/item3.xml><?xml version="1.0" encoding="utf-8"?>
 <ct:contentTypeSchema xmlns:ct="http://schemas.microsoft.com/office/2006/metadata/contentType" xmlns:ma="http://schemas.microsoft.com/office/2006/metadata/properties/metaAttributes" ct:_="" ma:_="" ma:contentTypeName="Picture" ma:contentTypeID="0x010102005A5C1BE65173D647975D08D04557E024" ma:contentTypeVersion="3" ma:contentTypeDescription="Upload an image or a photograph." ma:contentTypeScope="" ma:versionID="4e02033e9a8407b55ee482baa8e8773d">
   <xsd:schema xmlns:xsd="http://www.w3.org/2001/XMLSchema" xmlns:xs="http://www.w3.org/2001/XMLSchema" xmlns:p="http://schemas.microsoft.com/office/2006/metadata/properties" xmlns:ns1="http://schemas.microsoft.com/sharepoint/v3" xmlns:ns2="f2ad5090-61a8-4b8c-ab70-68f4ff4d1933" targetNamespace="http://schemas.microsoft.com/office/2006/metadata/properties" ma:root="true" ma:fieldsID="56baf7bb33d679821ced92383ddba583" ns1:_="" ns2:_="">
     <xsd:import namespace="http://schemas.microsoft.com/sharepoint/v3"/>
@@ -5609,41 +5520,79 @@
 </ct:contentTypeSchema>
 </file>
 
+<file path=customXml/item3.xml><?xml version="1.0" encoding="utf-8"?>
+<?mso-contentType ?>
+<FormTemplates xmlns="http://schemas.microsoft.com/sharepoint/v3/contenttype/forms">
+  <Display>DocumentLibraryForm</Display>
+  <Edit>DocumentLibraryForm</Edit>
+  <New>DocumentLibraryForm</New>
+</FormTemplates>
+</file>
+
 <file path=customXml/item4.xml><?xml version="1.0" encoding="utf-8"?>
-<p:properties xmlns:p="http://schemas.microsoft.com/office/2006/metadata/properties" xmlns:xsi="http://www.w3.org/2001/XMLSchema-instance">
-  <documentManagement>
-    <AlternateThumbnailUrl xmlns="http://schemas.microsoft.com/sharepoint/v3">
-      <Url xsi:nil="true"/>
-      <Description xsi:nil="true"/>
-    </AlternateThumbnailUrl>
-    <ImageCreateDate xmlns="http://schemas.microsoft.com/sharepoint/v3" xsi:nil="true"/>
-    <Description xmlns="http://schemas.microsoft.com/sharepoint/v3" xsi:nil="true"/>
-    <_dlc_DocId xmlns="f2ad5090-61a8-4b8c-ab70-68f4ff4d1933">ARM-ECM-0151353</_dlc_DocId>
-    <_dlc_DocIdUrl xmlns="f2ad5090-61a8-4b8c-ab70-68f4ff4d1933">
-      <Url>http://teamsites.arm.com/sites/marketing/branding/_layouts/DocIdRedir.aspx?ID=ARM-ECM-0151353</Url>
-      <Description>ARM-ECM-0151353</Description>
-    </_dlc_DocIdUrl>
-  </documentManagement>
-</p:properties>
+<?mso-contentType ?>
+<spe:Receivers xmlns:spe="http://schemas.microsoft.com/sharepoint/events">
+  <Receiver>
+    <Name>Document ID Generator</Name>
+    <Synchronization>Synchronous</Synchronization>
+    <Type>10001</Type>
+    <SequenceNumber>1000</SequenceNumber>
+    <Assembly>Microsoft.Office.DocumentManagement, Version=14.0.0.0, Culture=neutral, PublicKeyToken=71e9bce111e9429c</Assembly>
+    <Class>Microsoft.Office.DocumentManagement.Internal.DocIdHandler</Class>
+    <Data/>
+    <Filter/>
+  </Receiver>
+  <Receiver>
+    <Name>Document ID Generator</Name>
+    <Synchronization>Synchronous</Synchronization>
+    <Type>10002</Type>
+    <SequenceNumber>1001</SequenceNumber>
+    <Assembly>Microsoft.Office.DocumentManagement, Version=14.0.0.0, Culture=neutral, PublicKeyToken=71e9bce111e9429c</Assembly>
+    <Class>Microsoft.Office.DocumentManagement.Internal.DocIdHandler</Class>
+    <Data/>
+    <Filter/>
+  </Receiver>
+  <Receiver>
+    <Name>Document ID Generator</Name>
+    <Synchronization>Synchronous</Synchronization>
+    <Type>10004</Type>
+    <SequenceNumber>1002</SequenceNumber>
+    <Assembly>Microsoft.Office.DocumentManagement, Version=14.0.0.0, Culture=neutral, PublicKeyToken=71e9bce111e9429c</Assembly>
+    <Class>Microsoft.Office.DocumentManagement.Internal.DocIdHandler</Class>
+    <Data/>
+    <Filter/>
+  </Receiver>
+  <Receiver>
+    <Name>Document ID Generator</Name>
+    <Synchronization>Synchronous</Synchronization>
+    <Type>10006</Type>
+    <SequenceNumber>1003</SequenceNumber>
+    <Assembly>Microsoft.Office.DocumentManagement, Version=14.0.0.0, Culture=neutral, PublicKeyToken=71e9bce111e9429c</Assembly>
+    <Class>Microsoft.Office.DocumentManagement.Internal.DocIdHandler</Class>
+    <Data/>
+    <Filter/>
+  </Receiver>
+</spe:Receivers>
 </file>
 
 <file path=customXml/itemProps1.xml><?xml version="1.0" encoding="utf-8"?>
-<ds:datastoreItem xmlns:ds="http://schemas.openxmlformats.org/officeDocument/2006/customXml" ds:itemID="{C8CB23D7-89E5-42FF-A5EB-008A06AB37C7}">
+<ds:datastoreItem xmlns:ds="http://schemas.openxmlformats.org/officeDocument/2006/customXml" ds:itemID="{AE6E82D6-7FB8-4D99-A7B6-3C5BB1D894B9}">
   <ds:schemaRefs>
-    <ds:schemaRef ds:uri="http://schemas.microsoft.com/sharepoint/events"/>
+    <ds:schemaRef ds:uri="http://schemas.microsoft.com/office/2006/metadata/properties"/>
+    <ds:schemaRef ds:uri="http://schemas.openxmlformats.org/package/2006/metadata/core-properties"/>
+    <ds:schemaRef ds:uri="http://schemas.microsoft.com/office/2006/documentManagement/types"/>
+    <ds:schemaRef ds:uri="http://purl.org/dc/dcmitype/"/>
+    <ds:schemaRef ds:uri="http://purl.org/dc/elements/1.1/"/>
+    <ds:schemaRef ds:uri="http://schemas.microsoft.com/office/infopath/2007/PartnerControls"/>
+    <ds:schemaRef ds:uri="f2ad5090-61a8-4b8c-ab70-68f4ff4d1933"/>
+    <ds:schemaRef ds:uri="http://purl.org/dc/terms/"/>
+    <ds:schemaRef ds:uri="http://schemas.microsoft.com/sharepoint/v3"/>
+    <ds:schemaRef ds:uri="http://www.w3.org/XML/1998/namespace"/>
   </ds:schemaRefs>
 </ds:datastoreItem>
 </file>
 
 <file path=customXml/itemProps2.xml><?xml version="1.0" encoding="utf-8"?>
-<ds:datastoreItem xmlns:ds="http://schemas.openxmlformats.org/officeDocument/2006/customXml" ds:itemID="{9C777C69-0744-4BF3-8514-FB149EBD2248}">
-  <ds:schemaRefs>
-    <ds:schemaRef ds:uri="http://schemas.microsoft.com/sharepoint/v3/contenttype/forms"/>
-  </ds:schemaRefs>
-</ds:datastoreItem>
-</file>
-
-<file path=customXml/itemProps3.xml><?xml version="1.0" encoding="utf-8"?>
 <ds:datastoreItem xmlns:ds="http://schemas.openxmlformats.org/officeDocument/2006/customXml" ds:itemID="{E2FEA05E-38D0-44EA-8B8D-2375FC6AAF09}">
   <ds:schemaRefs>
     <ds:schemaRef ds:uri="http://schemas.microsoft.com/office/2006/metadata/contentType"/>
@@ -5662,19 +5611,18 @@
 </ds:datastoreItem>
 </file>
 
+<file path=customXml/itemProps3.xml><?xml version="1.0" encoding="utf-8"?>
+<ds:datastoreItem xmlns:ds="http://schemas.openxmlformats.org/officeDocument/2006/customXml" ds:itemID="{9C777C69-0744-4BF3-8514-FB149EBD2248}">
+  <ds:schemaRefs>
+    <ds:schemaRef ds:uri="http://schemas.microsoft.com/sharepoint/v3/contenttype/forms"/>
+  </ds:schemaRefs>
+</ds:datastoreItem>
+</file>
+
 <file path=customXml/itemProps4.xml><?xml version="1.0" encoding="utf-8"?>
-<ds:datastoreItem xmlns:ds="http://schemas.openxmlformats.org/officeDocument/2006/customXml" ds:itemID="{AE6E82D6-7FB8-4D99-A7B6-3C5BB1D894B9}">
+<ds:datastoreItem xmlns:ds="http://schemas.openxmlformats.org/officeDocument/2006/customXml" ds:itemID="{C8CB23D7-89E5-42FF-A5EB-008A06AB37C7}">
   <ds:schemaRefs>
-    <ds:schemaRef ds:uri="http://schemas.microsoft.com/office/2006/metadata/properties"/>
-    <ds:schemaRef ds:uri="http://schemas.openxmlformats.org/package/2006/metadata/core-properties"/>
-    <ds:schemaRef ds:uri="http://schemas.microsoft.com/office/2006/documentManagement/types"/>
-    <ds:schemaRef ds:uri="http://purl.org/dc/dcmitype/"/>
-    <ds:schemaRef ds:uri="http://purl.org/dc/elements/1.1/"/>
-    <ds:schemaRef ds:uri="http://schemas.microsoft.com/office/infopath/2007/PartnerControls"/>
-    <ds:schemaRef ds:uri="f2ad5090-61a8-4b8c-ab70-68f4ff4d1933"/>
-    <ds:schemaRef ds:uri="http://purl.org/dc/terms/"/>
-    <ds:schemaRef ds:uri="http://schemas.microsoft.com/sharepoint/v3"/>
-    <ds:schemaRef ds:uri="http://www.w3.org/XML/1998/namespace"/>
+    <ds:schemaRef ds:uri="http://schemas.microsoft.com/sharepoint/events"/>
   </ds:schemaRefs>
 </ds:datastoreItem>
 </file>
</xml_diff>